<commit_message>
added more validation metrics
</commit_message>
<xml_diff>
--- a/project_resources/Final_Presentation/Bytementor_Final_Presentation.pptx
+++ b/project_resources/Final_Presentation/Bytementor_Final_Presentation.pptx
@@ -205,7 +205,7 @@
           <a:p>
             <a:fld id="{146289C5-459A-40CF-9518-C2B483D7EE91}" type="datetimeFigureOut">
               <a:rPr lang="de-CH" smtClean="0"/>
-              <a:t>11.05.2025</a:t>
+              <a:t>13.05.2025</a:t>
             </a:fld>
             <a:endParaRPr lang="de-CH"/>
           </a:p>
@@ -721,7 +721,7 @@
           <a:p>
             <a:fld id="{FE22576C-7E93-421B-9883-5ECF7E3BA13F}" type="datetimeFigureOut">
               <a:rPr lang="de-CH" smtClean="0"/>
-              <a:t>11.05.2025</a:t>
+              <a:t>13.05.2025</a:t>
             </a:fld>
             <a:endParaRPr lang="de-CH"/>
           </a:p>
@@ -921,7 +921,7 @@
           <a:p>
             <a:fld id="{FE22576C-7E93-421B-9883-5ECF7E3BA13F}" type="datetimeFigureOut">
               <a:rPr lang="de-CH" smtClean="0"/>
-              <a:t>11.05.2025</a:t>
+              <a:t>13.05.2025</a:t>
             </a:fld>
             <a:endParaRPr lang="de-CH"/>
           </a:p>
@@ -1131,7 +1131,7 @@
           <a:p>
             <a:fld id="{FE22576C-7E93-421B-9883-5ECF7E3BA13F}" type="datetimeFigureOut">
               <a:rPr lang="de-CH" smtClean="0"/>
-              <a:t>11.05.2025</a:t>
+              <a:t>13.05.2025</a:t>
             </a:fld>
             <a:endParaRPr lang="de-CH"/>
           </a:p>
@@ -1331,7 +1331,7 @@
           <a:p>
             <a:fld id="{FE22576C-7E93-421B-9883-5ECF7E3BA13F}" type="datetimeFigureOut">
               <a:rPr lang="de-CH" smtClean="0"/>
-              <a:t>11.05.2025</a:t>
+              <a:t>13.05.2025</a:t>
             </a:fld>
             <a:endParaRPr lang="de-CH"/>
           </a:p>
@@ -1607,7 +1607,7 @@
           <a:p>
             <a:fld id="{FE22576C-7E93-421B-9883-5ECF7E3BA13F}" type="datetimeFigureOut">
               <a:rPr lang="de-CH" smtClean="0"/>
-              <a:t>11.05.2025</a:t>
+              <a:t>13.05.2025</a:t>
             </a:fld>
             <a:endParaRPr lang="de-CH"/>
           </a:p>
@@ -1875,7 +1875,7 @@
           <a:p>
             <a:fld id="{FE22576C-7E93-421B-9883-5ECF7E3BA13F}" type="datetimeFigureOut">
               <a:rPr lang="de-CH" smtClean="0"/>
-              <a:t>11.05.2025</a:t>
+              <a:t>13.05.2025</a:t>
             </a:fld>
             <a:endParaRPr lang="de-CH"/>
           </a:p>
@@ -2290,7 +2290,7 @@
           <a:p>
             <a:fld id="{FE22576C-7E93-421B-9883-5ECF7E3BA13F}" type="datetimeFigureOut">
               <a:rPr lang="de-CH" smtClean="0"/>
-              <a:t>11.05.2025</a:t>
+              <a:t>13.05.2025</a:t>
             </a:fld>
             <a:endParaRPr lang="de-CH"/>
           </a:p>
@@ -2432,7 +2432,7 @@
           <a:p>
             <a:fld id="{FE22576C-7E93-421B-9883-5ECF7E3BA13F}" type="datetimeFigureOut">
               <a:rPr lang="de-CH" smtClean="0"/>
-              <a:t>11.05.2025</a:t>
+              <a:t>13.05.2025</a:t>
             </a:fld>
             <a:endParaRPr lang="de-CH"/>
           </a:p>
@@ -2545,7 +2545,7 @@
           <a:p>
             <a:fld id="{FE22576C-7E93-421B-9883-5ECF7E3BA13F}" type="datetimeFigureOut">
               <a:rPr lang="de-CH" smtClean="0"/>
-              <a:t>11.05.2025</a:t>
+              <a:t>13.05.2025</a:t>
             </a:fld>
             <a:endParaRPr lang="de-CH"/>
           </a:p>
@@ -2858,7 +2858,7 @@
           <a:p>
             <a:fld id="{FE22576C-7E93-421B-9883-5ECF7E3BA13F}" type="datetimeFigureOut">
               <a:rPr lang="de-CH" smtClean="0"/>
-              <a:t>11.05.2025</a:t>
+              <a:t>13.05.2025</a:t>
             </a:fld>
             <a:endParaRPr lang="de-CH"/>
           </a:p>
@@ -3147,7 +3147,7 @@
           <a:p>
             <a:fld id="{FE22576C-7E93-421B-9883-5ECF7E3BA13F}" type="datetimeFigureOut">
               <a:rPr lang="de-CH" smtClean="0"/>
-              <a:t>11.05.2025</a:t>
+              <a:t>13.05.2025</a:t>
             </a:fld>
             <a:endParaRPr lang="de-CH"/>
           </a:p>
@@ -3390,7 +3390,7 @@
           <a:p>
             <a:fld id="{FE22576C-7E93-421B-9883-5ECF7E3BA13F}" type="datetimeFigureOut">
               <a:rPr lang="de-CH" smtClean="0"/>
-              <a:t>11.05.2025</a:t>
+              <a:t>13.05.2025</a:t>
             </a:fld>
             <a:endParaRPr lang="de-CH"/>
           </a:p>
@@ -5366,7 +5366,7 @@
         </p:blipFill>
         <p:spPr bwMode="auto">
           <a:xfrm>
-            <a:off x="5025806" y="4001294"/>
+            <a:off x="5045976" y="4001294"/>
             <a:ext cx="6101787" cy="2078215"/>
           </a:xfrm>
           <a:prstGeom prst="rect">
@@ -5845,13 +5845,13 @@
   <p:clrMapOvr>
     <a:masterClrMapping/>
   </p:clrMapOvr>
-  <mc:AlternateContent xmlns:mc="http://schemas.openxmlformats.org/markup-compatibility/2006">
-    <mc:Choice xmlns:p159="http://schemas.microsoft.com/office/powerpoint/2015/09/main" Requires="p159">
+  <mc:AlternateContent xmlns:mc="http://schemas.openxmlformats.org/markup-compatibility/2006" xmlns:p159="http://schemas.microsoft.com/office/powerpoint/2015/09/main">
+    <mc:Choice Requires="p159">
       <p:transition xmlns:p14="http://schemas.microsoft.com/office/powerpoint/2010/main" spd="slow" p14:dur="2000">
         <p159:morph option="byObject"/>
       </p:transition>
     </mc:Choice>
-    <mc:Fallback>
+    <mc:Fallback xmlns="">
       <p:transition spd="slow">
         <p:fade/>
       </p:transition>
@@ -6063,7 +6063,7 @@
                   </a:schemeClr>
                 </a:solidFill>
               </a:rPr>
-              <a:t>rate01-50:555</a:t>
+              <a:t>rate01-50:</a:t>
             </a:r>
           </a:p>
           <a:p>

</xml_diff>